<commit_message>
Fix date in Presentation
</commit_message>
<xml_diff>
--- a/sesión 4/Sesión 4 - Raíces de una Función.pptx
+++ b/sesión 4/Sesión 4 - Raíces de una Función.pptx
@@ -206,7 +206,7 @@
           <a:p>
             <a:fld id="{6044F738-2AAD-4F97-B1CF-0C9FEB36EEC1}" type="datetimeFigureOut">
               <a:rPr lang="es-CL" smtClean="0"/>
-              <a:t>30-08-2024</a:t>
+              <a:t>04-09-2024</a:t>
             </a:fld>
             <a:endParaRPr lang="es-CL"/>
           </a:p>
@@ -474,6 +474,90 @@
 </p:notesMaster>
 </file>
 
+<file path=ppt/notesSlides/notesSlide1.xml><?xml version="1.0" encoding="utf-8"?>
+<p:notes xmlns:a="http://schemas.openxmlformats.org/drawingml/2006/main" xmlns:r="http://schemas.openxmlformats.org/officeDocument/2006/relationships" xmlns:p="http://schemas.openxmlformats.org/presentationml/2006/main">
+  <p:cSld>
+    <p:spTree>
+      <p:nvGrpSpPr>
+        <p:cNvPr id="1" name=""/>
+        <p:cNvGrpSpPr/>
+        <p:nvPr/>
+      </p:nvGrpSpPr>
+      <p:grpSpPr>
+        <a:xfrm>
+          <a:off x="0" y="0"/>
+          <a:ext cx="0" cy="0"/>
+          <a:chOff x="0" y="0"/>
+          <a:chExt cx="0" cy="0"/>
+        </a:xfrm>
+      </p:grpSpPr>
+      <p:sp>
+        <p:nvSpPr>
+          <p:cNvPr id="2" name="Slide Image Placeholder 1"/>
+          <p:cNvSpPr>
+            <a:spLocks noGrp="1" noRot="1" noChangeAspect="1"/>
+          </p:cNvSpPr>
+          <p:nvPr>
+            <p:ph type="sldImg"/>
+          </p:nvPr>
+        </p:nvSpPr>
+        <p:spPr/>
+      </p:sp>
+      <p:sp>
+        <p:nvSpPr>
+          <p:cNvPr id="3" name="Notes Placeholder 2"/>
+          <p:cNvSpPr>
+            <a:spLocks noGrp="1"/>
+          </p:cNvSpPr>
+          <p:nvPr>
+            <p:ph type="body" idx="1"/>
+          </p:nvPr>
+        </p:nvSpPr>
+        <p:spPr/>
+        <p:txBody>
+          <a:bodyPr/>
+          <a:lstStyle/>
+          <a:p>
+            <a:endParaRPr lang="es-CL" dirty="0"/>
+          </a:p>
+        </p:txBody>
+      </p:sp>
+      <p:sp>
+        <p:nvSpPr>
+          <p:cNvPr id="4" name="Slide Number Placeholder 3"/>
+          <p:cNvSpPr>
+            <a:spLocks noGrp="1"/>
+          </p:cNvSpPr>
+          <p:nvPr>
+            <p:ph type="sldNum" sz="quarter" idx="5"/>
+          </p:nvPr>
+        </p:nvSpPr>
+        <p:spPr/>
+        <p:txBody>
+          <a:bodyPr/>
+          <a:lstStyle/>
+          <a:p>
+            <a:fld id="{77CD5095-0524-4258-B488-F25CBB7E83EA}" type="slidenum">
+              <a:rPr lang="es-CL" smtClean="0"/>
+              <a:t>8</a:t>
+            </a:fld>
+            <a:endParaRPr lang="es-CL"/>
+          </a:p>
+        </p:txBody>
+      </p:sp>
+    </p:spTree>
+    <p:extLst>
+      <p:ext uri="{BB962C8B-B14F-4D97-AF65-F5344CB8AC3E}">
+        <p14:creationId xmlns:p14="http://schemas.microsoft.com/office/powerpoint/2010/main" val="1266665681"/>
+      </p:ext>
+    </p:extLst>
+  </p:cSld>
+  <p:clrMapOvr>
+    <a:masterClrMapping/>
+  </p:clrMapOvr>
+</p:notes>
+</file>
+
 <file path=ppt/slideLayouts/slideLayout1.xml><?xml version="1.0" encoding="utf-8"?>
 <p:sldLayout xmlns:a="http://schemas.openxmlformats.org/drawingml/2006/main" xmlns:r="http://schemas.openxmlformats.org/officeDocument/2006/relationships" xmlns:p="http://schemas.openxmlformats.org/presentationml/2006/main" type="title" preserve="1">
   <p:cSld name="Title Slide">
@@ -605,7 +689,7 @@
           <a:p>
             <a:fld id="{7570A54D-0319-457E-B3CE-CCA3A75B49E8}" type="datetime1">
               <a:rPr lang="en-US" smtClean="0"/>
-              <a:t>8/30/2024</a:t>
+              <a:t>9/4/2024</a:t>
             </a:fld>
             <a:endParaRPr lang="en-US" dirty="0"/>
           </a:p>
@@ -775,7 +859,7 @@
           <a:p>
             <a:fld id="{2906CA5A-A29A-4D1A-A059-D739C116DFD0}" type="datetime1">
               <a:rPr lang="en-US" smtClean="0"/>
-              <a:t>8/30/2024</a:t>
+              <a:t>9/4/2024</a:t>
             </a:fld>
             <a:endParaRPr lang="en-US" dirty="0"/>
           </a:p>
@@ -955,7 +1039,7 @@
           <a:p>
             <a:fld id="{D1994232-B0F1-46C5-AC25-8526E22BCF0B}" type="datetime1">
               <a:rPr lang="en-US" smtClean="0"/>
-              <a:t>8/30/2024</a:t>
+              <a:t>9/4/2024</a:t>
             </a:fld>
             <a:endParaRPr lang="en-US" dirty="0"/>
           </a:p>
@@ -1125,7 +1209,7 @@
           <a:p>
             <a:fld id="{8725D1AD-76C0-4C52-8F56-061099C3163D}" type="datetime1">
               <a:rPr lang="en-US" smtClean="0"/>
-              <a:t>8/30/2024</a:t>
+              <a:t>9/4/2024</a:t>
             </a:fld>
             <a:endParaRPr lang="en-US" dirty="0"/>
           </a:p>
@@ -1371,7 +1455,7 @@
           <a:p>
             <a:fld id="{466A23B9-8890-410D-A949-04DAAA5D4FC8}" type="datetime1">
               <a:rPr lang="en-US" smtClean="0"/>
-              <a:t>8/30/2024</a:t>
+              <a:t>9/4/2024</a:t>
             </a:fld>
             <a:endParaRPr lang="en-US" dirty="0"/>
           </a:p>
@@ -1603,7 +1687,7 @@
           <a:p>
             <a:fld id="{61D3E20A-DFDC-4868-9367-172E7C23115E}" type="datetime1">
               <a:rPr lang="en-US" smtClean="0"/>
-              <a:t>8/30/2024</a:t>
+              <a:t>9/4/2024</a:t>
             </a:fld>
             <a:endParaRPr lang="en-US" dirty="0"/>
           </a:p>
@@ -1970,7 +2054,7 @@
           <a:p>
             <a:fld id="{343445B9-D253-4353-B97A-B5E60CFFA18F}" type="datetime1">
               <a:rPr lang="en-US" smtClean="0"/>
-              <a:t>8/30/2024</a:t>
+              <a:t>9/4/2024</a:t>
             </a:fld>
             <a:endParaRPr lang="en-US" dirty="0"/>
           </a:p>
@@ -2088,7 +2172,7 @@
           <a:p>
             <a:fld id="{61041E13-FEB0-489F-8E9F-1E9E801D387A}" type="datetime1">
               <a:rPr lang="en-US" smtClean="0"/>
-              <a:t>8/30/2024</a:t>
+              <a:t>9/4/2024</a:t>
             </a:fld>
             <a:endParaRPr lang="en-US" dirty="0"/>
           </a:p>
@@ -2183,7 +2267,7 @@
           <a:p>
             <a:fld id="{E1245079-8E0A-4191-B171-96AC44E29FA5}" type="datetime1">
               <a:rPr lang="en-US" smtClean="0"/>
-              <a:t>8/30/2024</a:t>
+              <a:t>9/4/2024</a:t>
             </a:fld>
             <a:endParaRPr lang="en-US" dirty="0"/>
           </a:p>
@@ -2460,7 +2544,7 @@
           <a:p>
             <a:fld id="{FD5C9544-EC61-4FCC-99A7-BF931F860A63}" type="datetime1">
               <a:rPr lang="en-US" smtClean="0"/>
-              <a:t>8/30/2024</a:t>
+              <a:t>9/4/2024</a:t>
             </a:fld>
             <a:endParaRPr lang="en-US" dirty="0"/>
           </a:p>
@@ -2716,7 +2800,7 @@
           <a:p>
             <a:fld id="{2E502294-9F58-4B97-B96A-294AED763AD5}" type="datetime1">
               <a:rPr lang="en-US" smtClean="0"/>
-              <a:t>8/30/2024</a:t>
+              <a:t>9/4/2024</a:t>
             </a:fld>
             <a:endParaRPr lang="en-US" dirty="0"/>
           </a:p>
@@ -2929,7 +3013,7 @@
           <a:p>
             <a:fld id="{1DD389F9-3CE9-4981-9958-5D54C3377EE6}" type="datetime1">
               <a:rPr lang="en-US" smtClean="0"/>
-              <a:t>8/30/2024</a:t>
+              <a:t>9/4/2024</a:t>
             </a:fld>
             <a:endParaRPr lang="en-US" dirty="0"/>
           </a:p>
@@ -3441,6 +3525,16 @@
           </a:p>
           <a:p>
             <a:r>
+              <a:rPr lang="es-CL">
+                <a:solidFill>
+                  <a:schemeClr val="tx2">
+                    <a:lumMod val="90000"/>
+                  </a:schemeClr>
+                </a:solidFill>
+              </a:rPr>
+              <a:t>Sábado 31 </a:t>
+            </a:r>
+            <a:r>
               <a:rPr lang="es-CL" dirty="0">
                 <a:solidFill>
                   <a:schemeClr val="tx2">
@@ -3448,7 +3542,7 @@
                   </a:schemeClr>
                 </a:solidFill>
               </a:rPr>
-              <a:t>Sábado 10 de Agosto 2024</a:t>
+              <a:t>de Agosto 2024</a:t>
             </a:r>
           </a:p>
         </p:txBody>
@@ -6525,7 +6619,7 @@
                 <a:ext cx="6317718" cy="2934586"/>
               </a:xfrm>
               <a:blipFill>
-                <a:blip r:embed="rId2"/>
+                <a:blip r:embed="rId3"/>
                 <a:stretch>
                   <a:fillRect l="-1929" t="-3527"/>
                 </a:stretch>
@@ -6575,8 +6669,8 @@
           </a:p>
         </p:txBody>
       </p:sp>
-      <mc:AlternateContent xmlns:mc="http://schemas.openxmlformats.org/markup-compatibility/2006">
-        <mc:Choice xmlns:a14="http://schemas.microsoft.com/office/drawing/2010/main" Requires="a14">
+      <mc:AlternateContent xmlns:mc="http://schemas.openxmlformats.org/markup-compatibility/2006" xmlns:a14="http://schemas.microsoft.com/office/drawing/2010/main">
+        <mc:Choice Requires="a14">
           <p:graphicFrame>
             <p:nvGraphicFramePr>
               <p:cNvPr id="7" name="Table 6">
@@ -6592,7 +6686,7 @@
               <p:nvPr>
                 <p:extLst>
                   <p:ext uri="{D42A27DB-BD31-4B8C-83A1-F6EECF244321}">
-                    <p14:modId xmlns:p14="http://schemas.microsoft.com/office/powerpoint/2010/main" val="2661401951"/>
+                    <p14:modId xmlns:p14="http://schemas.microsoft.com/office/powerpoint/2010/main" val="2500549802"/>
                   </p:ext>
                 </p:extLst>
               </p:nvPr>
@@ -7062,29 +7156,29 @@
                         <a:lstStyle/>
                         <a:p>
                           <a:pPr algn="ctr"/>
-                          <a:endParaRPr lang="es-CL"/>
-                        </a:p>
-                      </a:txBody>
-                      <a:tcPr/>
-                    </a:tc>
-                    <a:tc>
-                      <a:txBody>
-                        <a:bodyPr/>
-                        <a:lstStyle/>
-                        <a:p>
-                          <a:pPr algn="ctr"/>
-                          <a:endParaRPr lang="es-CL"/>
-                        </a:p>
-                      </a:txBody>
-                      <a:tcPr/>
-                    </a:tc>
-                    <a:tc>
-                      <a:txBody>
-                        <a:bodyPr/>
-                        <a:lstStyle/>
-                        <a:p>
-                          <a:pPr algn="ctr"/>
-                          <a:endParaRPr lang="es-CL"/>
+                          <a:endParaRPr lang="es-CL" dirty="0"/>
+                        </a:p>
+                      </a:txBody>
+                      <a:tcPr/>
+                    </a:tc>
+                    <a:tc>
+                      <a:txBody>
+                        <a:bodyPr/>
+                        <a:lstStyle/>
+                        <a:p>
+                          <a:pPr algn="ctr"/>
+                          <a:endParaRPr lang="es-CL" dirty="0"/>
+                        </a:p>
+                      </a:txBody>
+                      <a:tcPr/>
+                    </a:tc>
+                    <a:tc>
+                      <a:txBody>
+                        <a:bodyPr/>
+                        <a:lstStyle/>
+                        <a:p>
+                          <a:pPr algn="ctr"/>
+                          <a:endParaRPr lang="es-CL" dirty="0"/>
                         </a:p>
                       </a:txBody>
                       <a:tcPr/>
@@ -7127,51 +7221,51 @@
                         <a:lstStyle/>
                         <a:p>
                           <a:pPr algn="ctr"/>
-                          <a:endParaRPr lang="es-CL"/>
-                        </a:p>
-                      </a:txBody>
-                      <a:tcPr/>
-                    </a:tc>
-                    <a:tc>
-                      <a:txBody>
-                        <a:bodyPr/>
-                        <a:lstStyle/>
-                        <a:p>
-                          <a:pPr algn="ctr"/>
-                          <a:endParaRPr lang="es-CL"/>
-                        </a:p>
-                      </a:txBody>
-                      <a:tcPr/>
-                    </a:tc>
-                    <a:tc>
-                      <a:txBody>
-                        <a:bodyPr/>
-                        <a:lstStyle/>
-                        <a:p>
-                          <a:pPr algn="ctr"/>
-                          <a:endParaRPr lang="es-CL"/>
-                        </a:p>
-                      </a:txBody>
-                      <a:tcPr/>
-                    </a:tc>
-                    <a:tc>
-                      <a:txBody>
-                        <a:bodyPr/>
-                        <a:lstStyle/>
-                        <a:p>
-                          <a:pPr algn="ctr"/>
-                          <a:endParaRPr lang="es-CL"/>
-                        </a:p>
-                      </a:txBody>
-                      <a:tcPr/>
-                    </a:tc>
-                    <a:tc>
-                      <a:txBody>
-                        <a:bodyPr/>
-                        <a:lstStyle/>
-                        <a:p>
-                          <a:pPr algn="ctr"/>
-                          <a:endParaRPr lang="es-CL"/>
+                          <a:endParaRPr lang="es-CL" dirty="0"/>
+                        </a:p>
+                      </a:txBody>
+                      <a:tcPr/>
+                    </a:tc>
+                    <a:tc>
+                      <a:txBody>
+                        <a:bodyPr/>
+                        <a:lstStyle/>
+                        <a:p>
+                          <a:pPr algn="ctr"/>
+                          <a:endParaRPr lang="es-CL" dirty="0"/>
+                        </a:p>
+                      </a:txBody>
+                      <a:tcPr/>
+                    </a:tc>
+                    <a:tc>
+                      <a:txBody>
+                        <a:bodyPr/>
+                        <a:lstStyle/>
+                        <a:p>
+                          <a:pPr algn="ctr"/>
+                          <a:endParaRPr lang="es-CL" dirty="0"/>
+                        </a:p>
+                      </a:txBody>
+                      <a:tcPr/>
+                    </a:tc>
+                    <a:tc>
+                      <a:txBody>
+                        <a:bodyPr/>
+                        <a:lstStyle/>
+                        <a:p>
+                          <a:pPr algn="ctr"/>
+                          <a:endParaRPr lang="es-CL" dirty="0"/>
+                        </a:p>
+                      </a:txBody>
+                      <a:tcPr/>
+                    </a:tc>
+                    <a:tc>
+                      <a:txBody>
+                        <a:bodyPr/>
+                        <a:lstStyle/>
+                        <a:p>
+                          <a:pPr algn="ctr"/>
+                          <a:endParaRPr lang="es-CL" dirty="0"/>
                         </a:p>
                       </a:txBody>
                       <a:tcPr/>
@@ -7203,17 +7297,6 @@
                         <a:lstStyle/>
                         <a:p>
                           <a:pPr algn="ctr"/>
-                          <a:endParaRPr lang="es-CL"/>
-                        </a:p>
-                      </a:txBody>
-                      <a:tcPr/>
-                    </a:tc>
-                    <a:tc>
-                      <a:txBody>
-                        <a:bodyPr/>
-                        <a:lstStyle/>
-                        <a:p>
-                          <a:pPr algn="ctr"/>
                           <a:endParaRPr lang="es-CL" dirty="0"/>
                         </a:p>
                       </a:txBody>
@@ -7225,17 +7308,6 @@
                         <a:lstStyle/>
                         <a:p>
                           <a:pPr algn="ctr"/>
-                          <a:endParaRPr lang="es-CL"/>
-                        </a:p>
-                      </a:txBody>
-                      <a:tcPr/>
-                    </a:tc>
-                    <a:tc>
-                      <a:txBody>
-                        <a:bodyPr/>
-                        <a:lstStyle/>
-                        <a:p>
-                          <a:pPr algn="ctr"/>
                           <a:endParaRPr lang="es-CL" dirty="0"/>
                         </a:p>
                       </a:txBody>
@@ -7247,18 +7319,40 @@
                         <a:lstStyle/>
                         <a:p>
                           <a:pPr algn="ctr"/>
-                          <a:endParaRPr lang="es-CL"/>
-                        </a:p>
-                      </a:txBody>
-                      <a:tcPr/>
-                    </a:tc>
-                    <a:tc>
-                      <a:txBody>
-                        <a:bodyPr/>
-                        <a:lstStyle/>
-                        <a:p>
-                          <a:pPr algn="ctr"/>
-                          <a:endParaRPr lang="es-CL"/>
+                          <a:endParaRPr lang="es-CL" dirty="0"/>
+                        </a:p>
+                      </a:txBody>
+                      <a:tcPr/>
+                    </a:tc>
+                    <a:tc>
+                      <a:txBody>
+                        <a:bodyPr/>
+                        <a:lstStyle/>
+                        <a:p>
+                          <a:pPr algn="ctr"/>
+                          <a:endParaRPr lang="es-CL" dirty="0"/>
+                        </a:p>
+                      </a:txBody>
+                      <a:tcPr/>
+                    </a:tc>
+                    <a:tc>
+                      <a:txBody>
+                        <a:bodyPr/>
+                        <a:lstStyle/>
+                        <a:p>
+                          <a:pPr algn="ctr"/>
+                          <a:endParaRPr lang="es-CL" dirty="0"/>
+                        </a:p>
+                      </a:txBody>
+                      <a:tcPr/>
+                    </a:tc>
+                    <a:tc>
+                      <a:txBody>
+                        <a:bodyPr/>
+                        <a:lstStyle/>
+                        <a:p>
+                          <a:pPr algn="ctr"/>
+                          <a:endParaRPr lang="es-CL" dirty="0"/>
                         </a:p>
                       </a:txBody>
                       <a:tcPr/>
@@ -7290,18 +7384,18 @@
                         <a:lstStyle/>
                         <a:p>
                           <a:pPr algn="ctr"/>
-                          <a:endParaRPr lang="es-CL"/>
-                        </a:p>
-                      </a:txBody>
-                      <a:tcPr/>
-                    </a:tc>
-                    <a:tc>
-                      <a:txBody>
-                        <a:bodyPr/>
-                        <a:lstStyle/>
-                        <a:p>
-                          <a:pPr algn="ctr"/>
-                          <a:endParaRPr lang="es-CL"/>
+                          <a:endParaRPr lang="es-CL" dirty="0"/>
+                        </a:p>
+                      </a:txBody>
+                      <a:tcPr/>
+                    </a:tc>
+                    <a:tc>
+                      <a:txBody>
+                        <a:bodyPr/>
+                        <a:lstStyle/>
+                        <a:p>
+                          <a:pPr algn="ctr"/>
+                          <a:endParaRPr lang="es-CL" dirty="0"/>
                         </a:p>
                       </a:txBody>
                       <a:tcPr/>
@@ -7448,7 +7542,7 @@
             </a:graphic>
           </p:graphicFrame>
         </mc:Choice>
-        <mc:Fallback>
+        <mc:Fallback xmlns="">
           <p:graphicFrame>
             <p:nvGraphicFramePr>
               <p:cNvPr id="7" name="Table 6">
@@ -7464,7 +7558,7 @@
               <p:nvPr>
                 <p:extLst>
                   <p:ext uri="{D42A27DB-BD31-4B8C-83A1-F6EECF244321}">
-                    <p14:modId xmlns:p14="http://schemas.microsoft.com/office/powerpoint/2010/main" val="2661401951"/>
+                    <p14:modId xmlns:p14="http://schemas.microsoft.com/office/powerpoint/2010/main" val="2500549802"/>
                   </p:ext>
                 </p:extLst>
               </p:nvPr>
@@ -7555,7 +7649,7 @@
                       </a:txBody>
                       <a:tcPr>
                         <a:blipFill>
-                          <a:blip r:embed="rId3"/>
+                          <a:blip r:embed="rId4"/>
                           <a:stretch>
                             <a:fillRect l="-117178" t="-3361" r="-503681" b="-293277"/>
                           </a:stretch>
@@ -7572,7 +7666,7 @@
                       </a:txBody>
                       <a:tcPr>
                         <a:blipFill>
-                          <a:blip r:embed="rId3"/>
+                          <a:blip r:embed="rId4"/>
                           <a:stretch>
                             <a:fillRect l="-215854" t="-3361" r="-400610" b="-293277"/>
                           </a:stretch>
@@ -7589,7 +7683,7 @@
                       </a:txBody>
                       <a:tcPr>
                         <a:blipFill>
-                          <a:blip r:embed="rId3"/>
+                          <a:blip r:embed="rId4"/>
                           <a:stretch>
                             <a:fillRect l="-317791" t="-3361" r="-303067" b="-293277"/>
                           </a:stretch>
@@ -7606,7 +7700,7 @@
                       </a:txBody>
                       <a:tcPr>
                         <a:blipFill>
-                          <a:blip r:embed="rId3"/>
+                          <a:blip r:embed="rId4"/>
                           <a:stretch>
                             <a:fillRect l="-417791" t="-3361" r="-203067" b="-293277"/>
                           </a:stretch>
@@ -7623,7 +7717,7 @@
                       </a:txBody>
                       <a:tcPr>
                         <a:blipFill>
-                          <a:blip r:embed="rId3"/>
+                          <a:blip r:embed="rId4"/>
                           <a:stretch>
                             <a:fillRect l="-514634" t="-3361" r="-101829" b="-293277"/>
                           </a:stretch>
@@ -7640,7 +7734,7 @@
                       </a:txBody>
                       <a:tcPr>
                         <a:blipFill>
-                          <a:blip r:embed="rId3"/>
+                          <a:blip r:embed="rId4"/>
                           <a:stretch>
                             <a:fillRect l="-618405" t="-3361" r="-2454" b="-293277"/>
                           </a:stretch>
@@ -7713,29 +7807,29 @@
                         <a:lstStyle/>
                         <a:p>
                           <a:pPr algn="ctr"/>
-                          <a:endParaRPr lang="es-CL"/>
-                        </a:p>
-                      </a:txBody>
-                      <a:tcPr/>
-                    </a:tc>
-                    <a:tc>
-                      <a:txBody>
-                        <a:bodyPr/>
-                        <a:lstStyle/>
-                        <a:p>
-                          <a:pPr algn="ctr"/>
-                          <a:endParaRPr lang="es-CL"/>
-                        </a:p>
-                      </a:txBody>
-                      <a:tcPr/>
-                    </a:tc>
-                    <a:tc>
-                      <a:txBody>
-                        <a:bodyPr/>
-                        <a:lstStyle/>
-                        <a:p>
-                          <a:pPr algn="ctr"/>
-                          <a:endParaRPr lang="es-CL"/>
+                          <a:endParaRPr lang="es-CL" dirty="0"/>
+                        </a:p>
+                      </a:txBody>
+                      <a:tcPr/>
+                    </a:tc>
+                    <a:tc>
+                      <a:txBody>
+                        <a:bodyPr/>
+                        <a:lstStyle/>
+                        <a:p>
+                          <a:pPr algn="ctr"/>
+                          <a:endParaRPr lang="es-CL" dirty="0"/>
+                        </a:p>
+                      </a:txBody>
+                      <a:tcPr/>
+                    </a:tc>
+                    <a:tc>
+                      <a:txBody>
+                        <a:bodyPr/>
+                        <a:lstStyle/>
+                        <a:p>
+                          <a:pPr algn="ctr"/>
+                          <a:endParaRPr lang="es-CL" dirty="0"/>
                         </a:p>
                       </a:txBody>
                       <a:tcPr/>
@@ -7778,51 +7872,51 @@
                         <a:lstStyle/>
                         <a:p>
                           <a:pPr algn="ctr"/>
-                          <a:endParaRPr lang="es-CL"/>
-                        </a:p>
-                      </a:txBody>
-                      <a:tcPr/>
-                    </a:tc>
-                    <a:tc>
-                      <a:txBody>
-                        <a:bodyPr/>
-                        <a:lstStyle/>
-                        <a:p>
-                          <a:pPr algn="ctr"/>
-                          <a:endParaRPr lang="es-CL"/>
-                        </a:p>
-                      </a:txBody>
-                      <a:tcPr/>
-                    </a:tc>
-                    <a:tc>
-                      <a:txBody>
-                        <a:bodyPr/>
-                        <a:lstStyle/>
-                        <a:p>
-                          <a:pPr algn="ctr"/>
-                          <a:endParaRPr lang="es-CL"/>
-                        </a:p>
-                      </a:txBody>
-                      <a:tcPr/>
-                    </a:tc>
-                    <a:tc>
-                      <a:txBody>
-                        <a:bodyPr/>
-                        <a:lstStyle/>
-                        <a:p>
-                          <a:pPr algn="ctr"/>
-                          <a:endParaRPr lang="es-CL"/>
-                        </a:p>
-                      </a:txBody>
-                      <a:tcPr/>
-                    </a:tc>
-                    <a:tc>
-                      <a:txBody>
-                        <a:bodyPr/>
-                        <a:lstStyle/>
-                        <a:p>
-                          <a:pPr algn="ctr"/>
-                          <a:endParaRPr lang="es-CL"/>
+                          <a:endParaRPr lang="es-CL" dirty="0"/>
+                        </a:p>
+                      </a:txBody>
+                      <a:tcPr/>
+                    </a:tc>
+                    <a:tc>
+                      <a:txBody>
+                        <a:bodyPr/>
+                        <a:lstStyle/>
+                        <a:p>
+                          <a:pPr algn="ctr"/>
+                          <a:endParaRPr lang="es-CL" dirty="0"/>
+                        </a:p>
+                      </a:txBody>
+                      <a:tcPr/>
+                    </a:tc>
+                    <a:tc>
+                      <a:txBody>
+                        <a:bodyPr/>
+                        <a:lstStyle/>
+                        <a:p>
+                          <a:pPr algn="ctr"/>
+                          <a:endParaRPr lang="es-CL" dirty="0"/>
+                        </a:p>
+                      </a:txBody>
+                      <a:tcPr/>
+                    </a:tc>
+                    <a:tc>
+                      <a:txBody>
+                        <a:bodyPr/>
+                        <a:lstStyle/>
+                        <a:p>
+                          <a:pPr algn="ctr"/>
+                          <a:endParaRPr lang="es-CL" dirty="0"/>
+                        </a:p>
+                      </a:txBody>
+                      <a:tcPr/>
+                    </a:tc>
+                    <a:tc>
+                      <a:txBody>
+                        <a:bodyPr/>
+                        <a:lstStyle/>
+                        <a:p>
+                          <a:pPr algn="ctr"/>
+                          <a:endParaRPr lang="es-CL" dirty="0"/>
                         </a:p>
                       </a:txBody>
                       <a:tcPr/>
@@ -7854,17 +7948,6 @@
                         <a:lstStyle/>
                         <a:p>
                           <a:pPr algn="ctr"/>
-                          <a:endParaRPr lang="es-CL"/>
-                        </a:p>
-                      </a:txBody>
-                      <a:tcPr/>
-                    </a:tc>
-                    <a:tc>
-                      <a:txBody>
-                        <a:bodyPr/>
-                        <a:lstStyle/>
-                        <a:p>
-                          <a:pPr algn="ctr"/>
                           <a:endParaRPr lang="es-CL" dirty="0"/>
                         </a:p>
                       </a:txBody>
@@ -7876,17 +7959,6 @@
                         <a:lstStyle/>
                         <a:p>
                           <a:pPr algn="ctr"/>
-                          <a:endParaRPr lang="es-CL"/>
-                        </a:p>
-                      </a:txBody>
-                      <a:tcPr/>
-                    </a:tc>
-                    <a:tc>
-                      <a:txBody>
-                        <a:bodyPr/>
-                        <a:lstStyle/>
-                        <a:p>
-                          <a:pPr algn="ctr"/>
                           <a:endParaRPr lang="es-CL" dirty="0"/>
                         </a:p>
                       </a:txBody>
@@ -7898,18 +7970,40 @@
                         <a:lstStyle/>
                         <a:p>
                           <a:pPr algn="ctr"/>
-                          <a:endParaRPr lang="es-CL"/>
-                        </a:p>
-                      </a:txBody>
-                      <a:tcPr/>
-                    </a:tc>
-                    <a:tc>
-                      <a:txBody>
-                        <a:bodyPr/>
-                        <a:lstStyle/>
-                        <a:p>
-                          <a:pPr algn="ctr"/>
-                          <a:endParaRPr lang="es-CL"/>
+                          <a:endParaRPr lang="es-CL" dirty="0"/>
+                        </a:p>
+                      </a:txBody>
+                      <a:tcPr/>
+                    </a:tc>
+                    <a:tc>
+                      <a:txBody>
+                        <a:bodyPr/>
+                        <a:lstStyle/>
+                        <a:p>
+                          <a:pPr algn="ctr"/>
+                          <a:endParaRPr lang="es-CL" dirty="0"/>
+                        </a:p>
+                      </a:txBody>
+                      <a:tcPr/>
+                    </a:tc>
+                    <a:tc>
+                      <a:txBody>
+                        <a:bodyPr/>
+                        <a:lstStyle/>
+                        <a:p>
+                          <a:pPr algn="ctr"/>
+                          <a:endParaRPr lang="es-CL" dirty="0"/>
+                        </a:p>
+                      </a:txBody>
+                      <a:tcPr/>
+                    </a:tc>
+                    <a:tc>
+                      <a:txBody>
+                        <a:bodyPr/>
+                        <a:lstStyle/>
+                        <a:p>
+                          <a:pPr algn="ctr"/>
+                          <a:endParaRPr lang="es-CL" dirty="0"/>
                         </a:p>
                       </a:txBody>
                       <a:tcPr/>
@@ -7941,18 +8035,18 @@
                         <a:lstStyle/>
                         <a:p>
                           <a:pPr algn="ctr"/>
-                          <a:endParaRPr lang="es-CL"/>
-                        </a:p>
-                      </a:txBody>
-                      <a:tcPr/>
-                    </a:tc>
-                    <a:tc>
-                      <a:txBody>
-                        <a:bodyPr/>
-                        <a:lstStyle/>
-                        <a:p>
-                          <a:pPr algn="ctr"/>
-                          <a:endParaRPr lang="es-CL"/>
+                          <a:endParaRPr lang="es-CL" dirty="0"/>
+                        </a:p>
+                      </a:txBody>
+                      <a:tcPr/>
+                    </a:tc>
+                    <a:tc>
+                      <a:txBody>
+                        <a:bodyPr/>
+                        <a:lstStyle/>
+                        <a:p>
+                          <a:pPr algn="ctr"/>
+                          <a:endParaRPr lang="es-CL" dirty="0"/>
                         </a:p>
                       </a:txBody>
                       <a:tcPr/>
@@ -8115,7 +8209,7 @@
           <p:nvPr/>
         </p:nvPicPr>
         <p:blipFill>
-          <a:blip r:embed="rId4">
+          <a:blip r:embed="rId5">
             <a:extLst>
               <a:ext uri="{28A0092B-C50C-407E-A947-70E740481C1C}">
                 <a14:useLocalDpi xmlns:a14="http://schemas.microsoft.com/office/drawing/2010/main" val="0"/>
@@ -8438,8 +8532,8 @@
           </a:p>
         </p:txBody>
       </p:sp>
-      <mc:AlternateContent xmlns:mc="http://schemas.openxmlformats.org/markup-compatibility/2006">
-        <mc:Choice xmlns:a14="http://schemas.microsoft.com/office/drawing/2010/main" Requires="a14">
+      <mc:AlternateContent xmlns:mc="http://schemas.openxmlformats.org/markup-compatibility/2006" xmlns:a14="http://schemas.microsoft.com/office/drawing/2010/main">
+        <mc:Choice Requires="a14">
           <p:graphicFrame>
             <p:nvGraphicFramePr>
               <p:cNvPr id="7" name="Table 6">
@@ -9395,7 +9489,7 @@
             </a:graphic>
           </p:graphicFrame>
         </mc:Choice>
-        <mc:Fallback>
+        <mc:Fallback xmlns="">
           <p:graphicFrame>
             <p:nvGraphicFramePr>
               <p:cNvPr id="7" name="Table 6">
@@ -10131,8 +10225,8 @@
           </p:graphicFrame>
         </mc:Fallback>
       </mc:AlternateContent>
-      <mc:AlternateContent xmlns:mc="http://schemas.openxmlformats.org/markup-compatibility/2006">
-        <mc:Choice xmlns:a14="http://schemas.microsoft.com/office/drawing/2010/main" Requires="a14">
+      <mc:AlternateContent xmlns:mc="http://schemas.openxmlformats.org/markup-compatibility/2006" xmlns:a14="http://schemas.microsoft.com/office/drawing/2010/main">
+        <mc:Choice Requires="a14">
           <p:sp>
             <p:nvSpPr>
               <p:cNvPr id="2" name="Content Placeholder 2">
@@ -10373,7 +10467,7 @@
             </p:txBody>
           </p:sp>
         </mc:Choice>
-        <mc:Fallback>
+        <mc:Fallback xmlns="">
           <p:sp>
             <p:nvSpPr>
               <p:cNvPr id="2" name="Content Placeholder 2">

</xml_diff>